<commit_message>
Updated UNit 9 Presentation
</commit_message>
<xml_diff>
--- a/Budweiser EDA - Unit 9 with summary.pptx
+++ b/Budweiser EDA - Unit 9 with summary.pptx
@@ -122,12 +122,55 @@
 </p:presentation>
 </file>
 
-<file path=ppt/revisionInfo.xml><?xml version="1.0" encoding="utf-8"?>
-<p1510:revInfo xmlns:a="http://schemas.openxmlformats.org/drawingml/2006/main" xmlns:r="http://schemas.openxmlformats.org/officeDocument/2006/relationships" xmlns:p1510="http://schemas.microsoft.com/office/powerpoint/2015/10/main">
-  <p1510:revLst>
-    <p1510:client id="{53EE240E-8DB5-4B10-BBCC-0A77170D3943}" v="3" dt="2021-01-14T20:34:52.184"/>
-  </p1510:revLst>
-</p1510:revInfo>
+<file path=ppt/changesInfos/changesInfo1.xml><?xml version="1.0" encoding="utf-8"?>
+<pc:chgInfo xmlns:a="http://schemas.openxmlformats.org/drawingml/2006/main" xmlns:r="http://schemas.openxmlformats.org/officeDocument/2006/relationships" xmlns:ac="http://schemas.microsoft.com/office/drawing/2013/main/command" xmlns:pc="http://schemas.microsoft.com/office/powerpoint/2013/main/command">
+  <pc:docChgLst>
+    <pc:chgData name="Johnson, Cleveland D" userId="0cc8fedb-6c77-47ab-ad7d-cf1f5202985f" providerId="ADAL" clId="{98AC4FB5-0D53-4687-BAB6-526722077249}"/>
+    <pc:docChg chg="undo addSld delSld modSld">
+      <pc:chgData name="Johnson, Cleveland D" userId="0cc8fedb-6c77-47ab-ad7d-cf1f5202985f" providerId="ADAL" clId="{98AC4FB5-0D53-4687-BAB6-526722077249}" dt="2021-01-16T18:53:57.922" v="78" actId="20577"/>
+      <pc:docMkLst>
+        <pc:docMk/>
+      </pc:docMkLst>
+      <pc:sldChg chg="add del">
+        <pc:chgData name="Johnson, Cleveland D" userId="0cc8fedb-6c77-47ab-ad7d-cf1f5202985f" providerId="ADAL" clId="{98AC4FB5-0D53-4687-BAB6-526722077249}" dt="2021-01-16T18:41:03.450" v="77" actId="2696"/>
+        <pc:sldMkLst>
+          <pc:docMk/>
+          <pc:sldMk cId="4265227745" sldId="258"/>
+        </pc:sldMkLst>
+      </pc:sldChg>
+      <pc:sldChg chg="modSp">
+        <pc:chgData name="Johnson, Cleveland D" userId="0cc8fedb-6c77-47ab-ad7d-cf1f5202985f" providerId="ADAL" clId="{98AC4FB5-0D53-4687-BAB6-526722077249}" dt="2021-01-16T18:00:54.824" v="2" actId="20577"/>
+        <pc:sldMkLst>
+          <pc:docMk/>
+          <pc:sldMk cId="756069775" sldId="266"/>
+        </pc:sldMkLst>
+        <pc:spChg chg="mod">
+          <ac:chgData name="Johnson, Cleveland D" userId="0cc8fedb-6c77-47ab-ad7d-cf1f5202985f" providerId="ADAL" clId="{98AC4FB5-0D53-4687-BAB6-526722077249}" dt="2021-01-16T18:00:54.824" v="2" actId="20577"/>
+          <ac:spMkLst>
+            <pc:docMk/>
+            <pc:sldMk cId="756069775" sldId="266"/>
+            <ac:spMk id="5" creationId="{FFAA18F1-418D-40C0-B48F-FB88BDCDFF05}"/>
+          </ac:spMkLst>
+        </pc:spChg>
+      </pc:sldChg>
+      <pc:sldChg chg="modSp">
+        <pc:chgData name="Johnson, Cleveland D" userId="0cc8fedb-6c77-47ab-ad7d-cf1f5202985f" providerId="ADAL" clId="{98AC4FB5-0D53-4687-BAB6-526722077249}" dt="2021-01-16T18:53:57.922" v="78" actId="20577"/>
+        <pc:sldMkLst>
+          <pc:docMk/>
+          <pc:sldMk cId="3651910252" sldId="269"/>
+        </pc:sldMkLst>
+        <pc:spChg chg="mod">
+          <ac:chgData name="Johnson, Cleveland D" userId="0cc8fedb-6c77-47ab-ad7d-cf1f5202985f" providerId="ADAL" clId="{98AC4FB5-0D53-4687-BAB6-526722077249}" dt="2021-01-16T18:53:57.922" v="78" actId="20577"/>
+          <ac:spMkLst>
+            <pc:docMk/>
+            <pc:sldMk cId="3651910252" sldId="269"/>
+            <ac:spMk id="5" creationId="{FFAA18F1-418D-40C0-B48F-FB88BDCDFF05}"/>
+          </ac:spMkLst>
+        </pc:spChg>
+      </pc:sldChg>
+    </pc:docChg>
+  </pc:docChgLst>
+</pc:chgInfo>
 </file>
 
 <file path=ppt/slideLayouts/slideLayout1.xml><?xml version="1.0" encoding="utf-8"?>
@@ -277,7 +320,7 @@
           <a:p>
             <a:fld id="{5D038394-273E-4810-B1DA-87B0942588B0}" type="datetimeFigureOut">
               <a:rPr lang="en-US" smtClean="0"/>
-              <a:t>1/14/2021</a:t>
+              <a:t>1/16/2021</a:t>
             </a:fld>
             <a:endParaRPr lang="en-US"/>
           </a:p>
@@ -475,7 +518,7 @@
           <a:p>
             <a:fld id="{5D038394-273E-4810-B1DA-87B0942588B0}" type="datetimeFigureOut">
               <a:rPr lang="en-US" smtClean="0"/>
-              <a:t>1/14/2021</a:t>
+              <a:t>1/16/2021</a:t>
             </a:fld>
             <a:endParaRPr lang="en-US"/>
           </a:p>
@@ -683,7 +726,7 @@
           <a:p>
             <a:fld id="{5D038394-273E-4810-B1DA-87B0942588B0}" type="datetimeFigureOut">
               <a:rPr lang="en-US" smtClean="0"/>
-              <a:t>1/14/2021</a:t>
+              <a:t>1/16/2021</a:t>
             </a:fld>
             <a:endParaRPr lang="en-US"/>
           </a:p>
@@ -881,7 +924,7 @@
           <a:p>
             <a:fld id="{5D038394-273E-4810-B1DA-87B0942588B0}" type="datetimeFigureOut">
               <a:rPr lang="en-US" smtClean="0"/>
-              <a:t>1/14/2021</a:t>
+              <a:t>1/16/2021</a:t>
             </a:fld>
             <a:endParaRPr lang="en-US"/>
           </a:p>
@@ -1156,7 +1199,7 @@
           <a:p>
             <a:fld id="{5D038394-273E-4810-B1DA-87B0942588B0}" type="datetimeFigureOut">
               <a:rPr lang="en-US" smtClean="0"/>
-              <a:t>1/14/2021</a:t>
+              <a:t>1/16/2021</a:t>
             </a:fld>
             <a:endParaRPr lang="en-US"/>
           </a:p>
@@ -1421,7 +1464,7 @@
           <a:p>
             <a:fld id="{5D038394-273E-4810-B1DA-87B0942588B0}" type="datetimeFigureOut">
               <a:rPr lang="en-US" smtClean="0"/>
-              <a:t>1/14/2021</a:t>
+              <a:t>1/16/2021</a:t>
             </a:fld>
             <a:endParaRPr lang="en-US"/>
           </a:p>
@@ -1833,7 +1876,7 @@
           <a:p>
             <a:fld id="{5D038394-273E-4810-B1DA-87B0942588B0}" type="datetimeFigureOut">
               <a:rPr lang="en-US" smtClean="0"/>
-              <a:t>1/14/2021</a:t>
+              <a:t>1/16/2021</a:t>
             </a:fld>
             <a:endParaRPr lang="en-US"/>
           </a:p>
@@ -1974,7 +2017,7 @@
           <a:p>
             <a:fld id="{5D038394-273E-4810-B1DA-87B0942588B0}" type="datetimeFigureOut">
               <a:rPr lang="en-US" smtClean="0"/>
-              <a:t>1/14/2021</a:t>
+              <a:t>1/16/2021</a:t>
             </a:fld>
             <a:endParaRPr lang="en-US"/>
           </a:p>
@@ -2087,7 +2130,7 @@
           <a:p>
             <a:fld id="{5D038394-273E-4810-B1DA-87B0942588B0}" type="datetimeFigureOut">
               <a:rPr lang="en-US" smtClean="0"/>
-              <a:t>1/14/2021</a:t>
+              <a:t>1/16/2021</a:t>
             </a:fld>
             <a:endParaRPr lang="en-US"/>
           </a:p>
@@ -2398,7 +2441,7 @@
           <a:p>
             <a:fld id="{5D038394-273E-4810-B1DA-87B0942588B0}" type="datetimeFigureOut">
               <a:rPr lang="en-US" smtClean="0"/>
-              <a:t>1/14/2021</a:t>
+              <a:t>1/16/2021</a:t>
             </a:fld>
             <a:endParaRPr lang="en-US"/>
           </a:p>
@@ -2686,7 +2729,7 @@
           <a:p>
             <a:fld id="{5D038394-273E-4810-B1DA-87B0942588B0}" type="datetimeFigureOut">
               <a:rPr lang="en-US" smtClean="0"/>
-              <a:t>1/14/2021</a:t>
+              <a:t>1/16/2021</a:t>
             </a:fld>
             <a:endParaRPr lang="en-US"/>
           </a:p>
@@ -2927,7 +2970,7 @@
           <a:p>
             <a:fld id="{5D038394-273E-4810-B1DA-87B0942588B0}" type="datetimeFigureOut">
               <a:rPr lang="en-US" smtClean="0"/>
-              <a:t>1/14/2021</a:t>
+              <a:t>1/16/2021</a:t>
             </a:fld>
             <a:endParaRPr lang="en-US"/>
           </a:p>
@@ -3744,7 +3787,7 @@
             </a:pPr>
             <a:r>
               <a:rPr lang="en-US" dirty="0"/>
-              <a:t>Average of all beers seed ABV at 5.5% and IBU &gt; 30</a:t>
+              <a:t>Average of all beers show ABV at 5.5% and IBU &gt; 30</a:t>
             </a:r>
           </a:p>
           <a:p>
@@ -3776,9 +3819,10 @@
               </a:lnSpc>
             </a:pPr>
             <a:r>
-              <a:rPr lang="en-US" dirty="0"/>
+              <a:rPr lang="en-US"/>
               <a:t>What does the ABV distribution look like in the United States?</a:t>
             </a:r>
+            <a:endParaRPr lang="en-US" dirty="0"/>
           </a:p>
           <a:p>
             <a:pPr lvl="1">
@@ -5782,16 +5826,8 @@
 <file path=customXml/itemProps3.xml><?xml version="1.0" encoding="utf-8"?>
 <ds:datastoreItem xmlns:ds="http://schemas.openxmlformats.org/officeDocument/2006/customXml" ds:itemID="{D93F237E-861E-4A45-91C7-DDB684D0BEA6}">
   <ds:schemaRefs>
-    <ds:schemaRef ds:uri="http://purl.org/dc/terms/"/>
-    <ds:schemaRef ds:uri="http://schemas.openxmlformats.org/package/2006/metadata/core-properties"/>
-    <ds:schemaRef ds:uri="http://schemas.microsoft.com/office/2006/documentManagement/types"/>
-    <ds:schemaRef ds:uri="http://purl.org/dc/elements/1.1/"/>
     <ds:schemaRef ds:uri="http://schemas.microsoft.com/office/2006/metadata/properties"/>
     <ds:schemaRef ds:uri="http://schemas.microsoft.com/office/infopath/2007/PartnerControls"/>
-    <ds:schemaRef ds:uri="919ba9b7-33ce-4f35-9da8-90aec4a4a8fd"/>
-    <ds:schemaRef ds:uri="35360bb6-9540-4669-93c9-f83b5cf64b17"/>
-    <ds:schemaRef ds:uri="http://www.w3.org/XML/1998/namespace"/>
-    <ds:schemaRef ds:uri="http://purl.org/dc/dcmitype/"/>
   </ds:schemaRefs>
 </ds:datastoreItem>
 </file>
</xml_diff>